<commit_message>
fix dbscan & modify pitch- whatever
</commit_message>
<xml_diff>
--- a/pitch.pptx
+++ b/pitch.pptx
@@ -5,15 +5,18 @@
     <p:sldMasterId id="2147483660" r:id="rId1"/>
   </p:sldMasterIdLst>
   <p:notesMasterIdLst>
-    <p:notesMasterId r:id="rId8"/>
+    <p:notesMasterId r:id="rId11"/>
   </p:notesMasterIdLst>
   <p:sldIdLst>
     <p:sldId id="256" r:id="rId2"/>
     <p:sldId id="264" r:id="rId3"/>
-    <p:sldId id="265" r:id="rId4"/>
-    <p:sldId id="259" r:id="rId5"/>
-    <p:sldId id="263" r:id="rId6"/>
-    <p:sldId id="266" r:id="rId7"/>
+    <p:sldId id="267" r:id="rId4"/>
+    <p:sldId id="265" r:id="rId5"/>
+    <p:sldId id="259" r:id="rId6"/>
+    <p:sldId id="269" r:id="rId7"/>
+    <p:sldId id="263" r:id="rId8"/>
+    <p:sldId id="268" r:id="rId9"/>
+    <p:sldId id="266" r:id="rId10"/>
   </p:sldIdLst>
   <p:sldSz cx="12192000" cy="6858000"/>
   <p:notesSz cx="6858000" cy="9144000"/>
@@ -909,7 +912,7 @@
           <a:p>
             <a:fld id="{51332DEE-88BD-4AB3-9189-9926C6A8F862}" type="slidenum">
               <a:rPr lang="en-US" smtClean="0"/>
-              <a:t>3</a:t>
+              <a:t>4</a:t>
             </a:fld>
             <a:endParaRPr lang="en-US"/>
           </a:p>
@@ -1065,7 +1068,7 @@
           <a:p>
             <a:fld id="{51332DEE-88BD-4AB3-9189-9926C6A8F862}" type="slidenum">
               <a:rPr lang="en-US" smtClean="0"/>
-              <a:t>5</a:t>
+              <a:t>7</a:t>
             </a:fld>
             <a:endParaRPr lang="en-US"/>
           </a:p>
@@ -6749,7 +6752,7 @@
           <a:p>
             <a:r>
               <a:rPr lang="en-US" dirty="0"/>
-              <a:t>Animal protection and reservation</a:t>
+              <a:t>Animal – a sustainable eco system</a:t>
             </a:r>
           </a:p>
           <a:p>
@@ -6890,13 +6893,13 @@
   <p:clrMapOvr>
     <a:masterClrMapping/>
   </p:clrMapOvr>
-  <mc:AlternateContent xmlns:mc="http://schemas.openxmlformats.org/markup-compatibility/2006">
-    <mc:Choice xmlns:p159="http://schemas.microsoft.com/office/powerpoint/2015/09/main" Requires="p159">
+  <mc:AlternateContent xmlns:mc="http://schemas.openxmlformats.org/markup-compatibility/2006" xmlns:p159="http://schemas.microsoft.com/office/powerpoint/2015/09/main">
+    <mc:Choice Requires="p159">
       <p:transition xmlns:p14="http://schemas.microsoft.com/office/powerpoint/2010/main" spd="slow" p14:dur="2000">
         <p159:morph option="byObject"/>
       </p:transition>
     </mc:Choice>
-    <mc:Fallback>
+    <mc:Fallback xmlns="">
       <p:transition spd="slow">
         <p:fade/>
       </p:transition>
@@ -6906,6 +6909,152 @@
 </file>
 
 <file path=ppt/slides/slide3.xml><?xml version="1.0" encoding="utf-8"?>
+<p:sld xmlns:a="http://schemas.openxmlformats.org/drawingml/2006/main" xmlns:r="http://schemas.openxmlformats.org/officeDocument/2006/relationships" xmlns:p="http://schemas.openxmlformats.org/presentationml/2006/main">
+  <p:cSld>
+    <p:spTree>
+      <p:nvGrpSpPr>
+        <p:cNvPr id="1" name=""/>
+        <p:cNvGrpSpPr/>
+        <p:nvPr/>
+      </p:nvGrpSpPr>
+      <p:grpSpPr>
+        <a:xfrm>
+          <a:off x="0" y="0"/>
+          <a:ext cx="0" cy="0"/>
+          <a:chOff x="0" y="0"/>
+          <a:chExt cx="0" cy="0"/>
+        </a:xfrm>
+      </p:grpSpPr>
+      <p:sp>
+        <p:nvSpPr>
+          <p:cNvPr id="2" name="Title 1">
+            <a:extLst>
+              <a:ext uri="{FF2B5EF4-FFF2-40B4-BE49-F238E27FC236}">
+                <a16:creationId xmlns:a16="http://schemas.microsoft.com/office/drawing/2014/main" id="{A86502BB-AECC-4064-79CB-1BB54A244A30}"/>
+              </a:ext>
+            </a:extLst>
+          </p:cNvPr>
+          <p:cNvSpPr>
+            <a:spLocks noGrp="1"/>
+          </p:cNvSpPr>
+          <p:nvPr>
+            <p:ph type="title"/>
+          </p:nvPr>
+        </p:nvSpPr>
+        <p:spPr/>
+        <p:txBody>
+          <a:bodyPr/>
+          <a:lstStyle/>
+          <a:p>
+            <a:r>
+              <a:rPr lang="sv-SE" dirty="0" err="1"/>
+              <a:t>Dataset</a:t>
+            </a:r>
+            <a:r>
+              <a:rPr lang="sv-SE" dirty="0"/>
+              <a:t> &amp; </a:t>
+            </a:r>
+            <a:r>
+              <a:rPr lang="sv-SE" dirty="0" err="1"/>
+              <a:t>tracking</a:t>
+            </a:r>
+            <a:r>
+              <a:rPr lang="sv-SE" dirty="0"/>
+              <a:t> demo</a:t>
+            </a:r>
+            <a:endParaRPr lang="en-US" dirty="0"/>
+          </a:p>
+        </p:txBody>
+      </p:sp>
+      <p:sp>
+        <p:nvSpPr>
+          <p:cNvPr id="3" name="Content Placeholder 2">
+            <a:extLst>
+              <a:ext uri="{FF2B5EF4-FFF2-40B4-BE49-F238E27FC236}">
+                <a16:creationId xmlns:a16="http://schemas.microsoft.com/office/drawing/2014/main" id="{B11B8397-44D9-8126-EB81-F25D333914FB}"/>
+              </a:ext>
+            </a:extLst>
+          </p:cNvPr>
+          <p:cNvSpPr>
+            <a:spLocks noGrp="1"/>
+          </p:cNvSpPr>
+          <p:nvPr>
+            <p:ph idx="1"/>
+          </p:nvPr>
+        </p:nvSpPr>
+        <p:spPr/>
+        <p:txBody>
+          <a:bodyPr/>
+          <a:lstStyle/>
+          <a:p>
+            <a:r>
+              <a:rPr lang="sv-SE" dirty="0"/>
+              <a:t>Bakgrund om </a:t>
+            </a:r>
+            <a:r>
+              <a:rPr lang="sv-SE" dirty="0" err="1"/>
+              <a:t>dataset</a:t>
+            </a:r>
+            <a:endParaRPr lang="sv-SE" dirty="0"/>
+          </a:p>
+          <a:p>
+            <a:r>
+              <a:rPr lang="sv-SE" dirty="0" err="1"/>
+              <a:t>Visualizing</a:t>
+            </a:r>
+            <a:r>
+              <a:rPr lang="sv-SE" dirty="0"/>
+              <a:t> </a:t>
+            </a:r>
+            <a:r>
+              <a:rPr lang="sv-SE" dirty="0" err="1"/>
+              <a:t>with</a:t>
+            </a:r>
+            <a:r>
+              <a:rPr lang="sv-SE" dirty="0"/>
+              <a:t> </a:t>
+            </a:r>
+            <a:r>
+              <a:rPr lang="sv-SE" dirty="0" err="1"/>
+              <a:t>current</a:t>
+            </a:r>
+            <a:r>
+              <a:rPr lang="sv-SE" dirty="0"/>
+              <a:t> </a:t>
+            </a:r>
+            <a:r>
+              <a:rPr lang="sv-SE" dirty="0" err="1"/>
+              <a:t>tracking</a:t>
+            </a:r>
+            <a:r>
+              <a:rPr lang="sv-SE" dirty="0"/>
+              <a:t> </a:t>
+            </a:r>
+            <a:r>
+              <a:rPr lang="sv-SE" dirty="0" err="1"/>
+              <a:t>technology</a:t>
+            </a:r>
+            <a:endParaRPr lang="sv-SE" dirty="0"/>
+          </a:p>
+          <a:p>
+            <a:endParaRPr lang="en-US" dirty="0"/>
+          </a:p>
+        </p:txBody>
+      </p:sp>
+    </p:spTree>
+    <p:extLst>
+      <p:ext uri="{BB962C8B-B14F-4D97-AF65-F5344CB8AC3E}">
+        <p14:creationId xmlns:p14="http://schemas.microsoft.com/office/powerpoint/2010/main" val="926841943"/>
+      </p:ext>
+    </p:extLst>
+  </p:cSld>
+  <p:clrMapOvr>
+    <a:masterClrMapping/>
+  </p:clrMapOvr>
+</p:sld>
+</file>
+
+<file path=ppt/slides/slide4.xml><?xml version="1.0" encoding="utf-8"?>
 <p:sld xmlns:a="http://schemas.openxmlformats.org/drawingml/2006/main" xmlns:r="http://schemas.openxmlformats.org/officeDocument/2006/relationships" xmlns:p="http://schemas.openxmlformats.org/presentationml/2006/main">
   <p:cSld>
     <p:spTree>
@@ -7217,13 +7366,13 @@
   <p:clrMapOvr>
     <a:masterClrMapping/>
   </p:clrMapOvr>
-  <mc:AlternateContent xmlns:mc="http://schemas.openxmlformats.org/markup-compatibility/2006">
-    <mc:Choice xmlns:p159="http://schemas.microsoft.com/office/powerpoint/2015/09/main" Requires="p159">
+  <mc:AlternateContent xmlns:mc="http://schemas.openxmlformats.org/markup-compatibility/2006" xmlns:p159="http://schemas.microsoft.com/office/powerpoint/2015/09/main">
+    <mc:Choice Requires="p159">
       <p:transition xmlns:p14="http://schemas.microsoft.com/office/powerpoint/2010/main" spd="slow" p14:dur="2000">
         <p159:morph option="byObject"/>
       </p:transition>
     </mc:Choice>
-    <mc:Fallback>
+    <mc:Fallback xmlns="">
       <p:transition spd="slow">
         <p:fade/>
       </p:transition>
@@ -7232,7 +7381,7 @@
 </p:sld>
 </file>
 
-<file path=ppt/slides/slide4.xml><?xml version="1.0" encoding="utf-8"?>
+<file path=ppt/slides/slide5.xml><?xml version="1.0" encoding="utf-8"?>
 <p:sld xmlns:a="http://schemas.openxmlformats.org/drawingml/2006/main" xmlns:r="http://schemas.openxmlformats.org/officeDocument/2006/relationships" xmlns:p="http://schemas.openxmlformats.org/presentationml/2006/main">
   <p:cSld>
     <p:spTree>
@@ -7300,14 +7449,56 @@
           <a:lstStyle/>
           <a:p>
             <a:r>
+              <a:rPr lang="sv-SE" dirty="0" err="1"/>
+              <a:t>Groundbreaking</a:t>
+            </a:r>
+            <a:r>
               <a:rPr lang="sv-SE" dirty="0"/>
-              <a:t>Current tracking technology</a:t>
-            </a:r>
-          </a:p>
-          <a:p>
+              <a:t> AI/ML-</a:t>
+            </a:r>
+            <a:r>
+              <a:rPr lang="sv-SE" dirty="0" err="1"/>
+              <a:t>models</a:t>
+            </a:r>
+            <a:endParaRPr lang="sv-SE" dirty="0"/>
+          </a:p>
+          <a:p>
+            <a:pPr lvl="1"/>
             <a:r>
               <a:rPr lang="sv-SE" dirty="0"/>
-              <a:t>Groundbreaking AI/ML-models</a:t>
+              <a:t>DBSCAN </a:t>
+            </a:r>
+            <a:r>
+              <a:rPr lang="sv-SE" dirty="0" err="1"/>
+              <a:t>clustering</a:t>
+            </a:r>
+            <a:r>
+              <a:rPr lang="sv-SE" dirty="0"/>
+              <a:t> </a:t>
+            </a:r>
+            <a:r>
+              <a:rPr lang="sv-SE" dirty="0" err="1"/>
+              <a:t>model</a:t>
+            </a:r>
+            <a:endParaRPr lang="sv-SE" dirty="0"/>
+          </a:p>
+          <a:p>
+            <a:pPr lvl="1"/>
+            <a:r>
+              <a:rPr lang="sv-SE" dirty="0"/>
+              <a:t>VARMA </a:t>
+            </a:r>
+            <a:r>
+              <a:rPr lang="sv-SE" dirty="0" err="1"/>
+              <a:t>forecasting</a:t>
+            </a:r>
+            <a:r>
+              <a:rPr lang="sv-SE" dirty="0"/>
+              <a:t> </a:t>
+            </a:r>
+            <a:r>
+              <a:rPr lang="sv-SE" dirty="0" err="1"/>
+              <a:t>model</a:t>
             </a:r>
             <a:endParaRPr lang="en-SE" dirty="0"/>
           </a:p>
@@ -7425,13 +7616,13 @@
   <p:clrMapOvr>
     <a:masterClrMapping/>
   </p:clrMapOvr>
-  <mc:AlternateContent xmlns:mc="http://schemas.openxmlformats.org/markup-compatibility/2006">
-    <mc:Choice xmlns:p159="http://schemas.microsoft.com/office/powerpoint/2015/09/main" Requires="p159">
+  <mc:AlternateContent xmlns:mc="http://schemas.openxmlformats.org/markup-compatibility/2006" xmlns:p159="http://schemas.microsoft.com/office/powerpoint/2015/09/main">
+    <mc:Choice Requires="p159">
       <p:transition xmlns:p14="http://schemas.microsoft.com/office/powerpoint/2010/main" spd="slow" p14:dur="2000">
         <p159:morph option="byObject"/>
       </p:transition>
     </mc:Choice>
-    <mc:Fallback>
+    <mc:Fallback xmlns="">
       <p:transition spd="slow">
         <p:fade/>
       </p:transition>
@@ -7440,7 +7631,7 @@
 </p:sld>
 </file>
 
-<file path=ppt/slides/slide5.xml><?xml version="1.0" encoding="utf-8"?>
+<file path=ppt/slides/slide6.xml><?xml version="1.0" encoding="utf-8"?>
 <p:sld xmlns:a="http://schemas.openxmlformats.org/drawingml/2006/main" xmlns:r="http://schemas.openxmlformats.org/officeDocument/2006/relationships" xmlns:p="http://schemas.openxmlformats.org/presentationml/2006/main">
   <p:cSld>
     <p:spTree>
@@ -7462,6 +7653,98 @@
           <p:cNvPr id="2" name="Title 1">
             <a:extLst>
               <a:ext uri="{FF2B5EF4-FFF2-40B4-BE49-F238E27FC236}">
+                <a16:creationId xmlns:a16="http://schemas.microsoft.com/office/drawing/2014/main" id="{8AEED230-BF00-E150-C13A-4A2CE14ED187}"/>
+              </a:ext>
+            </a:extLst>
+          </p:cNvPr>
+          <p:cNvSpPr>
+            <a:spLocks noGrp="1"/>
+          </p:cNvSpPr>
+          <p:nvPr>
+            <p:ph type="title"/>
+          </p:nvPr>
+        </p:nvSpPr>
+        <p:spPr/>
+        <p:txBody>
+          <a:bodyPr/>
+          <a:lstStyle/>
+          <a:p>
+            <a:r>
+              <a:rPr lang="sv-SE" dirty="0"/>
+              <a:t>VARMA </a:t>
+            </a:r>
+            <a:r>
+              <a:rPr lang="sv-SE" dirty="0" err="1"/>
+              <a:t>Forecasting</a:t>
+            </a:r>
+            <a:r>
+              <a:rPr lang="sv-SE" dirty="0"/>
+              <a:t> 101</a:t>
+            </a:r>
+            <a:endParaRPr lang="en-US" dirty="0"/>
+          </a:p>
+        </p:txBody>
+      </p:sp>
+      <p:sp>
+        <p:nvSpPr>
+          <p:cNvPr id="3" name="Content Placeholder 2">
+            <a:extLst>
+              <a:ext uri="{FF2B5EF4-FFF2-40B4-BE49-F238E27FC236}">
+                <a16:creationId xmlns:a16="http://schemas.microsoft.com/office/drawing/2014/main" id="{1AD3CB40-A244-10D7-1F98-CEA8EF0C8729}"/>
+              </a:ext>
+            </a:extLst>
+          </p:cNvPr>
+          <p:cNvSpPr>
+            <a:spLocks noGrp="1"/>
+          </p:cNvSpPr>
+          <p:nvPr>
+            <p:ph idx="1"/>
+          </p:nvPr>
+        </p:nvSpPr>
+        <p:spPr/>
+        <p:txBody>
+          <a:bodyPr/>
+          <a:lstStyle/>
+          <a:p>
+            <a:endParaRPr lang="en-US" dirty="0"/>
+          </a:p>
+        </p:txBody>
+      </p:sp>
+    </p:spTree>
+    <p:extLst>
+      <p:ext uri="{BB962C8B-B14F-4D97-AF65-F5344CB8AC3E}">
+        <p14:creationId xmlns:p14="http://schemas.microsoft.com/office/powerpoint/2010/main" val="3795522085"/>
+      </p:ext>
+    </p:extLst>
+  </p:cSld>
+  <p:clrMapOvr>
+    <a:masterClrMapping/>
+  </p:clrMapOvr>
+</p:sld>
+</file>
+
+<file path=ppt/slides/slide7.xml><?xml version="1.0" encoding="utf-8"?>
+<p:sld xmlns:a="http://schemas.openxmlformats.org/drawingml/2006/main" xmlns:r="http://schemas.openxmlformats.org/officeDocument/2006/relationships" xmlns:p="http://schemas.openxmlformats.org/presentationml/2006/main">
+  <p:cSld>
+    <p:spTree>
+      <p:nvGrpSpPr>
+        <p:cNvPr id="1" name=""/>
+        <p:cNvGrpSpPr/>
+        <p:nvPr/>
+      </p:nvGrpSpPr>
+      <p:grpSpPr>
+        <a:xfrm>
+          <a:off x="0" y="0"/>
+          <a:ext cx="0" cy="0"/>
+          <a:chOff x="0" y="0"/>
+          <a:chExt cx="0" cy="0"/>
+        </a:xfrm>
+      </p:grpSpPr>
+      <p:sp>
+        <p:nvSpPr>
+          <p:cNvPr id="2" name="Title 1">
+            <a:extLst>
+              <a:ext uri="{FF2B5EF4-FFF2-40B4-BE49-F238E27FC236}">
                 <a16:creationId xmlns:a16="http://schemas.microsoft.com/office/drawing/2014/main" id="{ECE0B106-7389-1A90-1503-24214D1A43E5}"/>
               </a:ext>
             </a:extLst>
@@ -7506,7 +7789,12 @@
             <p:ph idx="1"/>
           </p:nvPr>
         </p:nvSpPr>
-        <p:spPr/>
+        <p:spPr>
+          <a:xfrm>
+            <a:off x="1587710" y="2160016"/>
+            <a:ext cx="9486690" cy="2336570"/>
+          </a:xfrm>
+        </p:spPr>
         <p:txBody>
           <a:bodyPr/>
           <a:lstStyle/>
@@ -7539,51 +7827,6 @@
               <a:t>goals</a:t>
             </a:r>
             <a:endParaRPr lang="sv-SE" dirty="0"/>
-          </a:p>
-          <a:p>
-            <a:r>
-              <a:rPr lang="sv-SE" dirty="0"/>
-              <a:t>Challenges</a:t>
-            </a:r>
-          </a:p>
-          <a:p>
-            <a:pPr lvl="1"/>
-            <a:r>
-              <a:rPr lang="sv-SE" dirty="0" err="1"/>
-              <a:t>Geographic</a:t>
-            </a:r>
-            <a:r>
-              <a:rPr lang="sv-SE" dirty="0"/>
-              <a:t> </a:t>
-            </a:r>
-            <a:r>
-              <a:rPr lang="sv-SE" dirty="0" err="1"/>
-              <a:t>plots</a:t>
-            </a:r>
-            <a:endParaRPr lang="sv-SE" dirty="0"/>
-          </a:p>
-          <a:p>
-            <a:pPr lvl="1"/>
-            <a:r>
-              <a:rPr lang="sv-SE" dirty="0" err="1"/>
-              <a:t>Time</a:t>
-            </a:r>
-            <a:r>
-              <a:rPr lang="sv-SE" dirty="0"/>
-              <a:t> and date in </a:t>
-            </a:r>
-            <a:r>
-              <a:rPr lang="sv-SE" dirty="0" err="1"/>
-              <a:t>dataset</a:t>
-            </a:r>
-            <a:r>
-              <a:rPr lang="sv-SE" dirty="0"/>
-              <a:t> </a:t>
-            </a:r>
-          </a:p>
-          <a:p>
-            <a:pPr lvl="1"/>
-            <a:endParaRPr lang="en-SE" dirty="0"/>
           </a:p>
         </p:txBody>
       </p:sp>
@@ -7689,6 +7932,259 @@
           </a:prstGeom>
         </p:spPr>
       </p:pic>
+      <p:sp>
+        <p:nvSpPr>
+          <p:cNvPr id="5" name="Content Placeholder 2">
+            <a:extLst>
+              <a:ext uri="{FF2B5EF4-FFF2-40B4-BE49-F238E27FC236}">
+                <a16:creationId xmlns:a16="http://schemas.microsoft.com/office/drawing/2014/main" id="{2D6360FD-7177-78A4-8070-5EE7166BF1EF}"/>
+              </a:ext>
+            </a:extLst>
+          </p:cNvPr>
+          <p:cNvSpPr txBox="1">
+            <a:spLocks/>
+          </p:cNvSpPr>
+          <p:nvPr/>
+        </p:nvSpPr>
+        <p:spPr>
+          <a:xfrm>
+            <a:off x="1587710" y="3926443"/>
+            <a:ext cx="9486690" cy="2336570"/>
+          </a:xfrm>
+          <a:prstGeom prst="rect">
+            <a:avLst/>
+          </a:prstGeom>
+        </p:spPr>
+        <p:txBody>
+          <a:bodyPr vert="horz" lIns="91440" tIns="45720" rIns="91440" bIns="45720" rtlCol="0">
+            <a:normAutofit/>
+          </a:bodyPr>
+          <a:lstStyle>
+            <a:lvl1pPr marL="228600" indent="-228600" algn="l" defTabSz="914400" rtl="0" eaLnBrk="1" latinLnBrk="0" hangingPunct="1">
+              <a:lnSpc>
+                <a:spcPct val="110000"/>
+              </a:lnSpc>
+              <a:spcBef>
+                <a:spcPts val="1200"/>
+              </a:spcBef>
+              <a:buClr>
+                <a:schemeClr val="accent1"/>
+              </a:buClr>
+              <a:buFont typeface="Arial" panose="020B0604020202020204" pitchFamily="34" charset="0"/>
+              <a:buChar char="•"/>
+              <a:defRPr sz="2200" kern="1200">
+                <a:solidFill>
+                  <a:schemeClr val="tx1"/>
+                </a:solidFill>
+                <a:latin typeface="+mn-lt"/>
+                <a:ea typeface="+mn-ea"/>
+                <a:cs typeface="+mn-cs"/>
+              </a:defRPr>
+            </a:lvl1pPr>
+            <a:lvl2pPr marL="457200" indent="-228600" algn="l" defTabSz="914400" rtl="0" eaLnBrk="1" latinLnBrk="0" hangingPunct="1">
+              <a:lnSpc>
+                <a:spcPct val="110000"/>
+              </a:lnSpc>
+              <a:spcBef>
+                <a:spcPts val="600"/>
+              </a:spcBef>
+              <a:buClr>
+                <a:schemeClr val="accent1"/>
+              </a:buClr>
+              <a:buFont typeface="Arial" panose="020B0604020202020204" pitchFamily="34" charset="0"/>
+              <a:buChar char="•"/>
+              <a:defRPr sz="1900" kern="1200">
+                <a:solidFill>
+                  <a:schemeClr val="tx1"/>
+                </a:solidFill>
+                <a:latin typeface="+mn-lt"/>
+                <a:ea typeface="+mn-ea"/>
+                <a:cs typeface="+mn-cs"/>
+              </a:defRPr>
+            </a:lvl2pPr>
+            <a:lvl3pPr marL="685800" indent="-228600" algn="l" defTabSz="914400" rtl="0" eaLnBrk="1" latinLnBrk="0" hangingPunct="1">
+              <a:lnSpc>
+                <a:spcPct val="110000"/>
+              </a:lnSpc>
+              <a:spcBef>
+                <a:spcPts val="600"/>
+              </a:spcBef>
+              <a:buClr>
+                <a:schemeClr val="accent1"/>
+              </a:buClr>
+              <a:buFont typeface="Arial" panose="020B0604020202020204" pitchFamily="34" charset="0"/>
+              <a:buChar char="•"/>
+              <a:defRPr sz="1700" kern="1200">
+                <a:solidFill>
+                  <a:schemeClr val="tx1"/>
+                </a:solidFill>
+                <a:latin typeface="+mn-lt"/>
+                <a:ea typeface="+mn-ea"/>
+                <a:cs typeface="+mn-cs"/>
+              </a:defRPr>
+            </a:lvl3pPr>
+            <a:lvl4pPr marL="914400" indent="-228600" algn="l" defTabSz="914400" rtl="0" eaLnBrk="1" latinLnBrk="0" hangingPunct="1">
+              <a:lnSpc>
+                <a:spcPct val="110000"/>
+              </a:lnSpc>
+              <a:spcBef>
+                <a:spcPts val="600"/>
+              </a:spcBef>
+              <a:buClr>
+                <a:schemeClr val="accent1"/>
+              </a:buClr>
+              <a:buFont typeface="Arial" panose="020B0604020202020204" pitchFamily="34" charset="0"/>
+              <a:buChar char="•"/>
+              <a:defRPr sz="1500" kern="1200">
+                <a:solidFill>
+                  <a:schemeClr val="tx1"/>
+                </a:solidFill>
+                <a:latin typeface="+mn-lt"/>
+                <a:ea typeface="+mn-ea"/>
+                <a:cs typeface="+mn-cs"/>
+              </a:defRPr>
+            </a:lvl4pPr>
+            <a:lvl5pPr marL="1143000" indent="-228600" algn="l" defTabSz="914400" rtl="0" eaLnBrk="1" latinLnBrk="0" hangingPunct="1">
+              <a:lnSpc>
+                <a:spcPct val="110000"/>
+              </a:lnSpc>
+              <a:spcBef>
+                <a:spcPts val="600"/>
+              </a:spcBef>
+              <a:buClr>
+                <a:schemeClr val="accent1"/>
+              </a:buClr>
+              <a:buFont typeface="Arial" panose="020B0604020202020204" pitchFamily="34" charset="0"/>
+              <a:buChar char="•"/>
+              <a:defRPr sz="1500" kern="1200">
+                <a:solidFill>
+                  <a:schemeClr val="tx1"/>
+                </a:solidFill>
+                <a:latin typeface="+mn-lt"/>
+                <a:ea typeface="+mn-ea"/>
+                <a:cs typeface="+mn-cs"/>
+              </a:defRPr>
+            </a:lvl5pPr>
+            <a:lvl6pPr marL="2514600" indent="-228600" algn="l" defTabSz="914400" rtl="0" eaLnBrk="1" latinLnBrk="0" hangingPunct="1">
+              <a:lnSpc>
+                <a:spcPct val="90000"/>
+              </a:lnSpc>
+              <a:spcBef>
+                <a:spcPts val="500"/>
+              </a:spcBef>
+              <a:buFont typeface="Arial" panose="020B0604020202020204" pitchFamily="34" charset="0"/>
+              <a:buChar char="•"/>
+              <a:defRPr sz="1800" kern="1200">
+                <a:solidFill>
+                  <a:schemeClr val="tx1"/>
+                </a:solidFill>
+                <a:latin typeface="+mn-lt"/>
+                <a:ea typeface="+mn-ea"/>
+                <a:cs typeface="+mn-cs"/>
+              </a:defRPr>
+            </a:lvl6pPr>
+            <a:lvl7pPr marL="2971800" indent="-228600" algn="l" defTabSz="914400" rtl="0" eaLnBrk="1" latinLnBrk="0" hangingPunct="1">
+              <a:lnSpc>
+                <a:spcPct val="90000"/>
+              </a:lnSpc>
+              <a:spcBef>
+                <a:spcPts val="500"/>
+              </a:spcBef>
+              <a:buFont typeface="Arial" panose="020B0604020202020204" pitchFamily="34" charset="0"/>
+              <a:buChar char="•"/>
+              <a:defRPr sz="1800" kern="1200">
+                <a:solidFill>
+                  <a:schemeClr val="tx1"/>
+                </a:solidFill>
+                <a:latin typeface="+mn-lt"/>
+                <a:ea typeface="+mn-ea"/>
+                <a:cs typeface="+mn-cs"/>
+              </a:defRPr>
+            </a:lvl7pPr>
+            <a:lvl8pPr marL="3429000" indent="-228600" algn="l" defTabSz="914400" rtl="0" eaLnBrk="1" latinLnBrk="0" hangingPunct="1">
+              <a:lnSpc>
+                <a:spcPct val="90000"/>
+              </a:lnSpc>
+              <a:spcBef>
+                <a:spcPts val="500"/>
+              </a:spcBef>
+              <a:buFont typeface="Arial" panose="020B0604020202020204" pitchFamily="34" charset="0"/>
+              <a:buChar char="•"/>
+              <a:defRPr sz="1800" kern="1200">
+                <a:solidFill>
+                  <a:schemeClr val="tx1"/>
+                </a:solidFill>
+                <a:latin typeface="+mn-lt"/>
+                <a:ea typeface="+mn-ea"/>
+                <a:cs typeface="+mn-cs"/>
+              </a:defRPr>
+            </a:lvl8pPr>
+            <a:lvl9pPr marL="3886200" indent="-228600" algn="l" defTabSz="914400" rtl="0" eaLnBrk="1" latinLnBrk="0" hangingPunct="1">
+              <a:lnSpc>
+                <a:spcPct val="90000"/>
+              </a:lnSpc>
+              <a:spcBef>
+                <a:spcPts val="500"/>
+              </a:spcBef>
+              <a:buFont typeface="Arial" panose="020B0604020202020204" pitchFamily="34" charset="0"/>
+              <a:buChar char="•"/>
+              <a:defRPr sz="1800" kern="1200">
+                <a:solidFill>
+                  <a:schemeClr val="tx1"/>
+                </a:solidFill>
+                <a:latin typeface="+mn-lt"/>
+                <a:ea typeface="+mn-ea"/>
+                <a:cs typeface="+mn-cs"/>
+              </a:defRPr>
+            </a:lvl9pPr>
+          </a:lstStyle>
+          <a:p>
+            <a:r>
+              <a:rPr lang="sv-SE" dirty="0"/>
+              <a:t>Challenges</a:t>
+            </a:r>
+          </a:p>
+          <a:p>
+            <a:pPr lvl="1"/>
+            <a:r>
+              <a:rPr lang="sv-SE" dirty="0" err="1"/>
+              <a:t>Geographic</a:t>
+            </a:r>
+            <a:r>
+              <a:rPr lang="sv-SE" dirty="0"/>
+              <a:t> </a:t>
+            </a:r>
+            <a:r>
+              <a:rPr lang="sv-SE" dirty="0" err="1"/>
+              <a:t>plots</a:t>
+            </a:r>
+            <a:endParaRPr lang="sv-SE" dirty="0"/>
+          </a:p>
+          <a:p>
+            <a:pPr lvl="1"/>
+            <a:r>
+              <a:rPr lang="sv-SE" dirty="0" err="1"/>
+              <a:t>Time</a:t>
+            </a:r>
+            <a:r>
+              <a:rPr lang="sv-SE" dirty="0"/>
+              <a:t> and date in </a:t>
+            </a:r>
+            <a:r>
+              <a:rPr lang="sv-SE" dirty="0" err="1"/>
+              <a:t>dataset</a:t>
+            </a:r>
+            <a:r>
+              <a:rPr lang="sv-SE" dirty="0"/>
+              <a:t> </a:t>
+            </a:r>
+          </a:p>
+          <a:p>
+            <a:pPr lvl="1"/>
+            <a:endParaRPr lang="en-SE" dirty="0"/>
+          </a:p>
+        </p:txBody>
+      </p:sp>
     </p:spTree>
     <p:extLst>
       <p:ext uri="{BB962C8B-B14F-4D97-AF65-F5344CB8AC3E}">
@@ -7699,22 +8195,196 @@
   <p:clrMapOvr>
     <a:masterClrMapping/>
   </p:clrMapOvr>
-  <mc:AlternateContent xmlns:mc="http://schemas.openxmlformats.org/markup-compatibility/2006">
-    <mc:Choice xmlns:p159="http://schemas.microsoft.com/office/powerpoint/2015/09/main" Requires="p159">
+  <mc:AlternateContent xmlns:mc="http://schemas.openxmlformats.org/markup-compatibility/2006" xmlns:p159="http://schemas.microsoft.com/office/powerpoint/2015/09/main">
+    <mc:Choice Requires="p159">
       <p:transition xmlns:p14="http://schemas.microsoft.com/office/powerpoint/2010/main" spd="slow" p14:dur="2000">
         <p159:morph option="byObject"/>
       </p:transition>
     </mc:Choice>
-    <mc:Fallback>
+    <mc:Fallback xmlns="">
       <p:transition spd="slow">
         <p:fade/>
       </p:transition>
     </mc:Fallback>
   </mc:AlternateContent>
+  <p:timing>
+    <p:tnLst>
+      <p:par>
+        <p:cTn id="1" dur="indefinite" restart="never" nodeType="tmRoot">
+          <p:childTnLst>
+            <p:seq concurrent="1" nextAc="seek">
+              <p:cTn id="2" dur="indefinite" nodeType="mainSeq">
+                <p:childTnLst>
+                  <p:par>
+                    <p:cTn id="3" fill="hold">
+                      <p:stCondLst>
+                        <p:cond delay="indefinite"/>
+                      </p:stCondLst>
+                      <p:childTnLst>
+                        <p:par>
+                          <p:cTn id="4" fill="hold">
+                            <p:stCondLst>
+                              <p:cond delay="0"/>
+                            </p:stCondLst>
+                            <p:childTnLst>
+                              <p:par>
+                                <p:cTn id="5" presetID="10" presetClass="entr" presetSubtype="0" fill="hold" grpId="0" nodeType="clickEffect">
+                                  <p:stCondLst>
+                                    <p:cond delay="0"/>
+                                  </p:stCondLst>
+                                  <p:childTnLst>
+                                    <p:set>
+                                      <p:cBhvr>
+                                        <p:cTn id="6" dur="1" fill="hold">
+                                          <p:stCondLst>
+                                            <p:cond delay="0"/>
+                                          </p:stCondLst>
+                                        </p:cTn>
+                                        <p:tgtEl>
+                                          <p:spTgt spid="5"/>
+                                        </p:tgtEl>
+                                        <p:attrNameLst>
+                                          <p:attrName>style.visibility</p:attrName>
+                                        </p:attrNameLst>
+                                      </p:cBhvr>
+                                      <p:to>
+                                        <p:strVal val="visible"/>
+                                      </p:to>
+                                    </p:set>
+                                    <p:animEffect transition="in" filter="fade">
+                                      <p:cBhvr>
+                                        <p:cTn id="7" dur="500"/>
+                                        <p:tgtEl>
+                                          <p:spTgt spid="5"/>
+                                        </p:tgtEl>
+                                      </p:cBhvr>
+                                    </p:animEffect>
+                                  </p:childTnLst>
+                                </p:cTn>
+                              </p:par>
+                            </p:childTnLst>
+                          </p:cTn>
+                        </p:par>
+                      </p:childTnLst>
+                    </p:cTn>
+                  </p:par>
+                </p:childTnLst>
+              </p:cTn>
+              <p:prevCondLst>
+                <p:cond evt="onPrev" delay="0">
+                  <p:tgtEl>
+                    <p:sldTgt/>
+                  </p:tgtEl>
+                </p:cond>
+              </p:prevCondLst>
+              <p:nextCondLst>
+                <p:cond evt="onNext" delay="0">
+                  <p:tgtEl>
+                    <p:sldTgt/>
+                  </p:tgtEl>
+                </p:cond>
+              </p:nextCondLst>
+            </p:seq>
+          </p:childTnLst>
+        </p:cTn>
+      </p:par>
+    </p:tnLst>
+    <p:bldLst>
+      <p:bldP spid="5" grpId="0"/>
+    </p:bldLst>
+  </p:timing>
 </p:sld>
 </file>
 
-<file path=ppt/slides/slide6.xml><?xml version="1.0" encoding="utf-8"?>
+<file path=ppt/slides/slide8.xml><?xml version="1.0" encoding="utf-8"?>
+<p:sld xmlns:a="http://schemas.openxmlformats.org/drawingml/2006/main" xmlns:r="http://schemas.openxmlformats.org/officeDocument/2006/relationships" xmlns:p="http://schemas.openxmlformats.org/presentationml/2006/main">
+  <p:cSld>
+    <p:spTree>
+      <p:nvGrpSpPr>
+        <p:cNvPr id="1" name=""/>
+        <p:cNvGrpSpPr/>
+        <p:nvPr/>
+      </p:nvGrpSpPr>
+      <p:grpSpPr>
+        <a:xfrm>
+          <a:off x="0" y="0"/>
+          <a:ext cx="0" cy="0"/>
+          <a:chOff x="0" y="0"/>
+          <a:chExt cx="0" cy="0"/>
+        </a:xfrm>
+      </p:grpSpPr>
+      <p:sp>
+        <p:nvSpPr>
+          <p:cNvPr id="2" name="Title 1">
+            <a:extLst>
+              <a:ext uri="{FF2B5EF4-FFF2-40B4-BE49-F238E27FC236}">
+                <a16:creationId xmlns:a16="http://schemas.microsoft.com/office/drawing/2014/main" id="{98035D16-3E40-4E04-5069-BE88E9E0558E}"/>
+              </a:ext>
+            </a:extLst>
+          </p:cNvPr>
+          <p:cNvSpPr>
+            <a:spLocks noGrp="1"/>
+          </p:cNvSpPr>
+          <p:nvPr>
+            <p:ph type="title"/>
+          </p:nvPr>
+        </p:nvSpPr>
+        <p:spPr/>
+        <p:txBody>
+          <a:bodyPr/>
+          <a:lstStyle/>
+          <a:p>
+            <a:r>
+              <a:rPr lang="sv-SE" dirty="0" err="1"/>
+              <a:t>Future</a:t>
+            </a:r>
+            <a:r>
+              <a:rPr lang="sv-SE" dirty="0"/>
+              <a:t> plans</a:t>
+            </a:r>
+            <a:endParaRPr lang="en-US" dirty="0"/>
+          </a:p>
+        </p:txBody>
+      </p:sp>
+      <p:sp>
+        <p:nvSpPr>
+          <p:cNvPr id="3" name="Content Placeholder 2">
+            <a:extLst>
+              <a:ext uri="{FF2B5EF4-FFF2-40B4-BE49-F238E27FC236}">
+                <a16:creationId xmlns:a16="http://schemas.microsoft.com/office/drawing/2014/main" id="{F2648FF4-0D04-2967-D901-74330642E176}"/>
+              </a:ext>
+            </a:extLst>
+          </p:cNvPr>
+          <p:cNvSpPr>
+            <a:spLocks noGrp="1"/>
+          </p:cNvSpPr>
+          <p:nvPr>
+            <p:ph idx="1"/>
+          </p:nvPr>
+        </p:nvSpPr>
+        <p:spPr/>
+        <p:txBody>
+          <a:bodyPr/>
+          <a:lstStyle/>
+          <a:p>
+            <a:endParaRPr lang="en-US"/>
+          </a:p>
+        </p:txBody>
+      </p:sp>
+    </p:spTree>
+    <p:extLst>
+      <p:ext uri="{BB962C8B-B14F-4D97-AF65-F5344CB8AC3E}">
+        <p14:creationId xmlns:p14="http://schemas.microsoft.com/office/powerpoint/2010/main" val="1929916053"/>
+      </p:ext>
+    </p:extLst>
+  </p:cSld>
+  <p:clrMapOvr>
+    <a:masterClrMapping/>
+  </p:clrMapOvr>
+</p:sld>
+</file>
+
+<file path=ppt/slides/slide9.xml><?xml version="1.0" encoding="utf-8"?>
 <p:sld xmlns:a="http://schemas.openxmlformats.org/drawingml/2006/main" xmlns:r="http://schemas.openxmlformats.org/officeDocument/2006/relationships" xmlns:p="http://schemas.openxmlformats.org/presentationml/2006/main">
   <p:cSld>
     <p:spTree>
@@ -8018,13 +8688,13 @@
   <p:clrMapOvr>
     <a:masterClrMapping/>
   </p:clrMapOvr>
-  <mc:AlternateContent xmlns:mc="http://schemas.openxmlformats.org/markup-compatibility/2006">
-    <mc:Choice xmlns:p14="http://schemas.microsoft.com/office/powerpoint/2010/main" Requires="p14">
+  <mc:AlternateContent xmlns:mc="http://schemas.openxmlformats.org/markup-compatibility/2006" xmlns:p14="http://schemas.microsoft.com/office/powerpoint/2010/main">
+    <mc:Choice Requires="p14">
       <p:transition spd="slow" p14:dur="1500">
         <p:split orient="vert"/>
       </p:transition>
     </mc:Choice>
-    <mc:Fallback>
+    <mc:Fallback xmlns="">
       <p:transition spd="slow">
         <p:split orient="vert"/>
       </p:transition>

</xml_diff>